<commit_message>
Final Commit, de jsp's zijn aangepast en presentatie is geupdate met mijn stukje code
</commit_message>
<xml_diff>
--- a/ZeeslagPresentatie2.pptx
+++ b/ZeeslagPresentatie2.pptx
@@ -19,8 +19,8 @@
     <p:sldId id="271" r:id="rId10"/>
     <p:sldId id="262" r:id="rId11"/>
     <p:sldId id="264" r:id="rId12"/>
-    <p:sldId id="272" r:id="rId13"/>
-    <p:sldId id="269" r:id="rId14"/>
+    <p:sldId id="269" r:id="rId13"/>
+    <p:sldId id="272" r:id="rId14"/>
     <p:sldId id="265" r:id="rId15"/>
   </p:sldIdLst>
   <p:sldSz cx="9144000" cy="6858000" type="screen4x3"/>
@@ -5979,16 +5979,226 @@
           <a:chExt cx="0" cy="0"/>
         </a:xfrm>
       </p:grpSpPr>
+      <p:sp>
+        <p:nvSpPr>
+          <p:cNvPr id="2" name="Titel 1"/>
+          <p:cNvSpPr>
+            <a:spLocks noGrp="1"/>
+          </p:cNvSpPr>
+          <p:nvPr>
+            <p:ph type="title"/>
+          </p:nvPr>
+        </p:nvSpPr>
+        <p:spPr/>
+        <p:txBody>
+          <a:bodyPr/>
+          <a:lstStyle/>
+          <a:p>
+            <a:r>
+              <a:rPr lang="nl-NL" dirty="0" smtClean="0"/>
+              <a:t>REST &amp; AJAX</a:t>
+            </a:r>
+            <a:endParaRPr lang="nl-NL" dirty="0"/>
+          </a:p>
+        </p:txBody>
+      </p:sp>
+      <p:sp>
+        <p:nvSpPr>
+          <p:cNvPr id="3" name="Tijdelijke aanduiding voor inhoud 2"/>
+          <p:cNvSpPr>
+            <a:spLocks noGrp="1"/>
+          </p:cNvSpPr>
+          <p:nvPr>
+            <p:ph idx="1"/>
+          </p:nvPr>
+        </p:nvSpPr>
+        <p:spPr/>
+        <p:txBody>
+          <a:bodyPr>
+            <a:normAutofit/>
+          </a:bodyPr>
+          <a:lstStyle/>
+          <a:p>
+            <a:r>
+              <a:rPr lang="nl-NL" sz="3600" dirty="0" smtClean="0"/>
+              <a:t>Updates van site zonder </a:t>
+            </a:r>
+            <a:r>
+              <a:rPr lang="nl-NL" sz="3600" dirty="0" err="1" smtClean="0"/>
+              <a:t>request</a:t>
+            </a:r>
+            <a:endParaRPr lang="nl-NL" sz="3600" dirty="0" smtClean="0"/>
+          </a:p>
+          <a:p>
+            <a:endParaRPr lang="nl-NL" sz="3600" dirty="0" smtClean="0"/>
+          </a:p>
+          <a:p>
+            <a:r>
+              <a:rPr lang="nl-NL" sz="3600" dirty="0" smtClean="0"/>
+              <a:t>Bord updaten na beurt</a:t>
+            </a:r>
+          </a:p>
+          <a:p>
+            <a:pPr lvl="1"/>
+            <a:r>
+              <a:rPr lang="nl-NL" sz="3200" dirty="0" smtClean="0"/>
+              <a:t>Handig voor Turn-</a:t>
+            </a:r>
+            <a:r>
+              <a:rPr lang="nl-NL" sz="3200" dirty="0" err="1" smtClean="0"/>
+              <a:t>Based</a:t>
+            </a:r>
+            <a:endParaRPr lang="nl-NL" sz="3200" dirty="0" smtClean="0"/>
+          </a:p>
+          <a:p>
+            <a:pPr lvl="1"/>
+            <a:r>
+              <a:rPr lang="nl-NL" sz="3200" dirty="0"/>
+              <a:t>Geen meta-</a:t>
+            </a:r>
+            <a:r>
+              <a:rPr lang="nl-NL" sz="3200" dirty="0" err="1"/>
+              <a:t>refresh</a:t>
+            </a:r>
+            <a:r>
+              <a:rPr lang="nl-NL" sz="3200" dirty="0"/>
+              <a:t> nodig</a:t>
+            </a:r>
+          </a:p>
+          <a:p>
+            <a:pPr lvl="1"/>
+            <a:r>
+              <a:rPr lang="nl-NL" sz="3200" dirty="0"/>
+              <a:t>Vloeiendere overgang voor gebruiker</a:t>
+            </a:r>
+          </a:p>
+          <a:p>
+            <a:pPr lvl="1"/>
+            <a:endParaRPr lang="nl-NL" sz="3600" dirty="0" smtClean="0"/>
+          </a:p>
+          <a:p>
+            <a:endParaRPr lang="nl-NL" sz="3600" dirty="0" smtClean="0"/>
+          </a:p>
+          <a:p>
+            <a:pPr lvl="1"/>
+            <a:endParaRPr lang="nl-NL" sz="3600" dirty="0" smtClean="0"/>
+          </a:p>
+        </p:txBody>
+      </p:sp>
+      <p:sp>
+        <p:nvSpPr>
+          <p:cNvPr id="4" name="Tijdelijke aanduiding voor datum 3"/>
+          <p:cNvSpPr>
+            <a:spLocks noGrp="1"/>
+          </p:cNvSpPr>
+          <p:nvPr>
+            <p:ph type="dt" sz="half" idx="10"/>
+          </p:nvPr>
+        </p:nvSpPr>
+        <p:spPr/>
+        <p:txBody>
+          <a:bodyPr/>
+          <a:lstStyle/>
+          <a:p>
+            <a:fld id="{E4D620AB-80A7-4718-8A84-72BC8767E2D5}" type="datetime1">
+              <a:rPr lang="nl-NL" smtClean="0"/>
+              <a:pPr/>
+              <a:t>19-11-2015</a:t>
+            </a:fld>
+            <a:endParaRPr lang="nl-NL"/>
+          </a:p>
+        </p:txBody>
+      </p:sp>
+      <p:sp>
+        <p:nvSpPr>
+          <p:cNvPr id="5" name="Tijdelijke aanduiding voor voettekst 4"/>
+          <p:cNvSpPr>
+            <a:spLocks noGrp="1"/>
+          </p:cNvSpPr>
+          <p:nvPr>
+            <p:ph type="ftr" sz="quarter" idx="11"/>
+          </p:nvPr>
+        </p:nvSpPr>
+        <p:spPr/>
+        <p:txBody>
+          <a:bodyPr/>
+          <a:lstStyle/>
+          <a:p>
+            <a:endParaRPr lang="nl-NL"/>
+          </a:p>
+        </p:txBody>
+      </p:sp>
+      <p:sp>
+        <p:nvSpPr>
+          <p:cNvPr id="6" name="Tijdelijke aanduiding voor dianummer 5"/>
+          <p:cNvSpPr>
+            <a:spLocks noGrp="1"/>
+          </p:cNvSpPr>
+          <p:nvPr>
+            <p:ph type="sldNum" sz="quarter" idx="12"/>
+          </p:nvPr>
+        </p:nvSpPr>
+        <p:spPr/>
+        <p:txBody>
+          <a:bodyPr/>
+          <a:lstStyle/>
+          <a:p>
+            <a:fld id="{8EDE433C-975D-40E0-AA17-C907AC02EBEB}" type="slidenum">
+              <a:rPr lang="nl-NL" smtClean="0"/>
+              <a:pPr/>
+              <a:t>12</a:t>
+            </a:fld>
+            <a:endParaRPr lang="nl-NL"/>
+          </a:p>
+        </p:txBody>
+      </p:sp>
+    </p:spTree>
+    <p:extLst>
+      <p:ext uri="{BB962C8B-B14F-4D97-AF65-F5344CB8AC3E}">
+        <p14:creationId xmlns:p14="http://schemas.microsoft.com/office/powerpoint/2010/main" val="3869784468"/>
+      </p:ext>
+    </p:extLst>
+  </p:cSld>
+  <p:clrMapOvr>
+    <a:masterClrMapping/>
+  </p:clrMapOvr>
+  <p:timing>
+    <p:tnLst>
+      <p:par>
+        <p:cTn id="1" dur="indefinite" restart="never" nodeType="tmRoot"/>
+      </p:par>
+    </p:tnLst>
+  </p:timing>
+</p:sld>
+</file>
+
+<file path=ppt/slides/slide13.xml><?xml version="1.0" encoding="utf-8"?>
+<p:sld xmlns:a="http://schemas.openxmlformats.org/drawingml/2006/main" xmlns:r="http://schemas.openxmlformats.org/officeDocument/2006/relationships" xmlns:p="http://schemas.openxmlformats.org/presentationml/2006/main">
+  <p:cSld>
+    <p:spTree>
+      <p:nvGrpSpPr>
+        <p:cNvPr id="1" name=""/>
+        <p:cNvGrpSpPr/>
+        <p:nvPr/>
+      </p:nvGrpSpPr>
+      <p:grpSpPr>
+        <a:xfrm>
+          <a:off x="0" y="0"/>
+          <a:ext cx="0" cy="0"/>
+          <a:chOff x="0" y="0"/>
+          <a:chExt cx="0" cy="0"/>
+        </a:xfrm>
+      </p:grpSpPr>
       <p:pic>
         <p:nvPicPr>
-          <p:cNvPr id="4098" name="Picture 2"/>
+          <p:cNvPr id="1026" name="Picture 2"/>
           <p:cNvPicPr>
             <a:picLocks noChangeAspect="1" noChangeArrowheads="1"/>
           </p:cNvPicPr>
           <p:nvPr/>
         </p:nvPicPr>
         <p:blipFill>
-          <a:blip r:embed="rId2" cstate="print">
+          <a:blip r:embed="rId2">
             <a:extLst>
               <a:ext uri="{28A0092B-C50C-407E-A947-70E740481C1C}">
                 <a14:useLocalDpi xmlns:a14="http://schemas.microsoft.com/office/drawing/2010/main" val="0"/>
@@ -6002,8 +6212,8 @@
         </p:blipFill>
         <p:spPr bwMode="auto">
           <a:xfrm>
-            <a:off x="81397" y="46527"/>
-            <a:ext cx="9085957" cy="5665899"/>
+            <a:off x="-13230" y="0"/>
+            <a:ext cx="6732240" cy="6884009"/>
           </a:xfrm>
           <a:prstGeom prst="rect">
             <a:avLst/>
@@ -6094,7 +6304,7 @@
             <a:fld id="{8EDE433C-975D-40E0-AA17-C907AC02EBEB}" type="slidenum">
               <a:rPr lang="nl-NL" smtClean="0"/>
               <a:pPr/>
-              <a:t>12</a:t>
+              <a:t>13</a:t>
             </a:fld>
             <a:endParaRPr lang="nl-NL"/>
           </a:p>
@@ -6108,8 +6318,8 @@
         </p:nvSpPr>
         <p:spPr>
           <a:xfrm>
-            <a:off x="1979712" y="1124744"/>
-            <a:ext cx="5927238" cy="1944216"/>
+            <a:off x="827584" y="1844824"/>
+            <a:ext cx="3024336" cy="1440160"/>
           </a:xfrm>
           <a:prstGeom prst="rect">
             <a:avLst/>
@@ -6164,8 +6374,8 @@
         </p:blipFill>
         <p:spPr bwMode="auto">
           <a:xfrm>
-            <a:off x="6997306" y="3789040"/>
-            <a:ext cx="1819287" cy="2903044"/>
+            <a:off x="6719010" y="1052736"/>
+            <a:ext cx="2398807" cy="3827786"/>
           </a:xfrm>
           <a:prstGeom prst="rect">
             <a:avLst/>
@@ -6203,8 +6413,8 @@
         </p:nvSpPr>
         <p:spPr>
           <a:xfrm>
-            <a:off x="2195736" y="3068960"/>
-            <a:ext cx="5256584" cy="576064"/>
+            <a:off x="-13230" y="4005064"/>
+            <a:ext cx="6673462" cy="1440160"/>
           </a:xfrm>
           <a:prstGeom prst="rect">
             <a:avLst/>
@@ -6244,8 +6454,8 @@
         </p:nvSpPr>
         <p:spPr>
           <a:xfrm>
-            <a:off x="41517" y="4437112"/>
-            <a:ext cx="4901814" cy="1201402"/>
+            <a:off x="-13230" y="5426094"/>
+            <a:ext cx="6673462" cy="1431906"/>
           </a:xfrm>
           <a:prstGeom prst="rect">
             <a:avLst/>
@@ -6548,216 +6758,6 @@
       <p:bldP spid="13" grpId="0" animBg="1"/>
       <p:bldP spid="14" grpId="0" animBg="1"/>
     </p:bldLst>
-  </p:timing>
-</p:sld>
-</file>
-
-<file path=ppt/slides/slide13.xml><?xml version="1.0" encoding="utf-8"?>
-<p:sld xmlns:a="http://schemas.openxmlformats.org/drawingml/2006/main" xmlns:r="http://schemas.openxmlformats.org/officeDocument/2006/relationships" xmlns:p="http://schemas.openxmlformats.org/presentationml/2006/main">
-  <p:cSld>
-    <p:spTree>
-      <p:nvGrpSpPr>
-        <p:cNvPr id="1" name=""/>
-        <p:cNvGrpSpPr/>
-        <p:nvPr/>
-      </p:nvGrpSpPr>
-      <p:grpSpPr>
-        <a:xfrm>
-          <a:off x="0" y="0"/>
-          <a:ext cx="0" cy="0"/>
-          <a:chOff x="0" y="0"/>
-          <a:chExt cx="0" cy="0"/>
-        </a:xfrm>
-      </p:grpSpPr>
-      <p:sp>
-        <p:nvSpPr>
-          <p:cNvPr id="2" name="Titel 1"/>
-          <p:cNvSpPr>
-            <a:spLocks noGrp="1"/>
-          </p:cNvSpPr>
-          <p:nvPr>
-            <p:ph type="title"/>
-          </p:nvPr>
-        </p:nvSpPr>
-        <p:spPr/>
-        <p:txBody>
-          <a:bodyPr/>
-          <a:lstStyle/>
-          <a:p>
-            <a:r>
-              <a:rPr lang="nl-NL" dirty="0" smtClean="0"/>
-              <a:t>REST &amp; AJAX</a:t>
-            </a:r>
-            <a:endParaRPr lang="nl-NL" dirty="0"/>
-          </a:p>
-        </p:txBody>
-      </p:sp>
-      <p:sp>
-        <p:nvSpPr>
-          <p:cNvPr id="3" name="Tijdelijke aanduiding voor inhoud 2"/>
-          <p:cNvSpPr>
-            <a:spLocks noGrp="1"/>
-          </p:cNvSpPr>
-          <p:nvPr>
-            <p:ph idx="1"/>
-          </p:nvPr>
-        </p:nvSpPr>
-        <p:spPr/>
-        <p:txBody>
-          <a:bodyPr>
-            <a:normAutofit/>
-          </a:bodyPr>
-          <a:lstStyle/>
-          <a:p>
-            <a:r>
-              <a:rPr lang="nl-NL" sz="3600" dirty="0" smtClean="0"/>
-              <a:t>Updates van site zonder </a:t>
-            </a:r>
-            <a:r>
-              <a:rPr lang="nl-NL" sz="3600" dirty="0" err="1" smtClean="0"/>
-              <a:t>request</a:t>
-            </a:r>
-            <a:endParaRPr lang="nl-NL" sz="3600" dirty="0" smtClean="0"/>
-          </a:p>
-          <a:p>
-            <a:endParaRPr lang="nl-NL" sz="3600" dirty="0" smtClean="0"/>
-          </a:p>
-          <a:p>
-            <a:r>
-              <a:rPr lang="nl-NL" sz="3600" dirty="0" smtClean="0"/>
-              <a:t>Bord updaten na beurt</a:t>
-            </a:r>
-          </a:p>
-          <a:p>
-            <a:pPr lvl="1"/>
-            <a:r>
-              <a:rPr lang="nl-NL" sz="3200" dirty="0" smtClean="0"/>
-              <a:t>Handig voor Turn-</a:t>
-            </a:r>
-            <a:r>
-              <a:rPr lang="nl-NL" sz="3200" dirty="0" err="1" smtClean="0"/>
-              <a:t>Based</a:t>
-            </a:r>
-            <a:endParaRPr lang="nl-NL" sz="3200" dirty="0" smtClean="0"/>
-          </a:p>
-          <a:p>
-            <a:pPr lvl="1"/>
-            <a:r>
-              <a:rPr lang="nl-NL" sz="3200" dirty="0"/>
-              <a:t>Geen meta-</a:t>
-            </a:r>
-            <a:r>
-              <a:rPr lang="nl-NL" sz="3200" dirty="0" err="1"/>
-              <a:t>refresh</a:t>
-            </a:r>
-            <a:r>
-              <a:rPr lang="nl-NL" sz="3200" dirty="0"/>
-              <a:t> nodig</a:t>
-            </a:r>
-          </a:p>
-          <a:p>
-            <a:pPr lvl="1"/>
-            <a:r>
-              <a:rPr lang="nl-NL" sz="3200" dirty="0"/>
-              <a:t>Vloeiendere overgang voor gebruiker</a:t>
-            </a:r>
-          </a:p>
-          <a:p>
-            <a:pPr lvl="1"/>
-            <a:endParaRPr lang="nl-NL" sz="3600" dirty="0" smtClean="0"/>
-          </a:p>
-          <a:p>
-            <a:endParaRPr lang="nl-NL" sz="3600" dirty="0" smtClean="0"/>
-          </a:p>
-          <a:p>
-            <a:pPr lvl="1"/>
-            <a:endParaRPr lang="nl-NL" sz="3600" dirty="0" smtClean="0"/>
-          </a:p>
-        </p:txBody>
-      </p:sp>
-      <p:sp>
-        <p:nvSpPr>
-          <p:cNvPr id="4" name="Tijdelijke aanduiding voor datum 3"/>
-          <p:cNvSpPr>
-            <a:spLocks noGrp="1"/>
-          </p:cNvSpPr>
-          <p:nvPr>
-            <p:ph type="dt" sz="half" idx="10"/>
-          </p:nvPr>
-        </p:nvSpPr>
-        <p:spPr/>
-        <p:txBody>
-          <a:bodyPr/>
-          <a:lstStyle/>
-          <a:p>
-            <a:fld id="{E4D620AB-80A7-4718-8A84-72BC8767E2D5}" type="datetime1">
-              <a:rPr lang="nl-NL" smtClean="0"/>
-              <a:pPr/>
-              <a:t>19-11-2015</a:t>
-            </a:fld>
-            <a:endParaRPr lang="nl-NL"/>
-          </a:p>
-        </p:txBody>
-      </p:sp>
-      <p:sp>
-        <p:nvSpPr>
-          <p:cNvPr id="5" name="Tijdelijke aanduiding voor voettekst 4"/>
-          <p:cNvSpPr>
-            <a:spLocks noGrp="1"/>
-          </p:cNvSpPr>
-          <p:nvPr>
-            <p:ph type="ftr" sz="quarter" idx="11"/>
-          </p:nvPr>
-        </p:nvSpPr>
-        <p:spPr/>
-        <p:txBody>
-          <a:bodyPr/>
-          <a:lstStyle/>
-          <a:p>
-            <a:endParaRPr lang="nl-NL"/>
-          </a:p>
-        </p:txBody>
-      </p:sp>
-      <p:sp>
-        <p:nvSpPr>
-          <p:cNvPr id="6" name="Tijdelijke aanduiding voor dianummer 5"/>
-          <p:cNvSpPr>
-            <a:spLocks noGrp="1"/>
-          </p:cNvSpPr>
-          <p:nvPr>
-            <p:ph type="sldNum" sz="quarter" idx="12"/>
-          </p:nvPr>
-        </p:nvSpPr>
-        <p:spPr/>
-        <p:txBody>
-          <a:bodyPr/>
-          <a:lstStyle/>
-          <a:p>
-            <a:fld id="{8EDE433C-975D-40E0-AA17-C907AC02EBEB}" type="slidenum">
-              <a:rPr lang="nl-NL" smtClean="0"/>
-              <a:pPr/>
-              <a:t>13</a:t>
-            </a:fld>
-            <a:endParaRPr lang="nl-NL"/>
-          </a:p>
-        </p:txBody>
-      </p:sp>
-    </p:spTree>
-    <p:extLst>
-      <p:ext uri="{BB962C8B-B14F-4D97-AF65-F5344CB8AC3E}">
-        <p14:creationId xmlns:p14="http://schemas.microsoft.com/office/powerpoint/2010/main" val="3869784468"/>
-      </p:ext>
-    </p:extLst>
-  </p:cSld>
-  <p:clrMapOvr>
-    <a:masterClrMapping/>
-  </p:clrMapOvr>
-  <p:timing>
-    <p:tnLst>
-      <p:par>
-        <p:cTn id="1" dur="indefinite" restart="never" nodeType="tmRoot"/>
-      </p:par>
-    </p:tnLst>
   </p:timing>
 </p:sld>
 </file>
@@ -8777,11 +8777,7 @@
           <a:p>
             <a:r>
               <a:rPr lang="en-US" sz="4000" dirty="0" smtClean="0"/>
-              <a:t>HTML5, CSS3</a:t>
-            </a:r>
-            <a:r>
-              <a:rPr lang="en-US" sz="4000" dirty="0" smtClean="0"/>
-              <a:t>			</a:t>
+              <a:t>HTML5, CSS3			</a:t>
             </a:r>
             <a:r>
               <a:rPr lang="en-US" sz="2600" i="1" dirty="0" err="1" smtClean="0"/>
@@ -8829,15 +8825,7 @@
           <a:p>
             <a:r>
               <a:rPr lang="en-US" sz="4000" dirty="0" smtClean="0"/>
-              <a:t>AJAX</a:t>
-            </a:r>
-            <a:r>
-              <a:rPr lang="en-US" sz="4000" dirty="0" smtClean="0"/>
-              <a:t>				</a:t>
-            </a:r>
-            <a:r>
-              <a:rPr lang="en-US" sz="4000" dirty="0" smtClean="0"/>
-              <a:t>	</a:t>
+              <a:t>AJAX					</a:t>
             </a:r>
             <a:r>
               <a:rPr lang="en-US" i="1" dirty="0" err="1" smtClean="0"/>

</xml_diff>